<commit_message>
add readme && update ppt/doc
</commit_message>
<xml_diff>
--- a/程序设计ppt.pptx
+++ b/程序设计ppt.pptx
@@ -3,23 +3,23 @@
 <p:presentation xmlns:a="http://schemas.openxmlformats.org/drawingml/2006/main" xmlns:r="http://schemas.openxmlformats.org/officeDocument/2006/relationships" xmlns:p="http://schemas.openxmlformats.org/presentationml/2006/main" autoCompressPictures="0">
   <p:sldMasterIdLst>
     <p:sldMasterId id="2147483648" r:id="rId1"/>
-    <p:sldMasterId id="2147483667" r:id="rId3"/>
+    <p:sldMasterId id="2147483667" r:id="rId2"/>
   </p:sldMasterIdLst>
   <p:notesMasterIdLst>
-    <p:notesMasterId r:id="rId10"/>
+    <p:notesMasterId r:id="rId9"/>
   </p:notesMasterIdLst>
   <p:sldIdLst>
-    <p:sldId id="289" r:id="rId4"/>
-    <p:sldId id="259" r:id="rId5"/>
-    <p:sldId id="269" r:id="rId6"/>
-    <p:sldId id="270" r:id="rId7"/>
-    <p:sldId id="268" r:id="rId8"/>
-    <p:sldId id="282" r:id="rId9"/>
+    <p:sldId id="289" r:id="rId3"/>
+    <p:sldId id="259" r:id="rId4"/>
+    <p:sldId id="269" r:id="rId5"/>
+    <p:sldId id="270" r:id="rId6"/>
+    <p:sldId id="268" r:id="rId7"/>
+    <p:sldId id="282" r:id="rId8"/>
   </p:sldIdLst>
   <p:sldSz cx="12192000" cy="6858000"/>
   <p:notesSz cx="6858000" cy="9144000"/>
   <p:custDataLst>
-    <p:tags r:id="rId14"/>
+    <p:tags r:id="rId10"/>
   </p:custDataLst>
   <p:defaultTextStyle>
     <a:defPPr>
@@ -116,6 +116,11 @@
       </a:defRPr>
     </a:lvl9pPr>
   </p:defaultTextStyle>
+  <p:extLst>
+    <p:ext uri="{EFAFB233-063F-42B5-8137-9DF3F51BA10A}">
+      <p15:sldGuideLst xmlns:p15="http://schemas.microsoft.com/office/powerpoint/2012/main"/>
+    </p:ext>
+  </p:extLst>
 </p:presentation>
 </file>
 
@@ -201,6 +206,7 @@
           <a:p>
             <a:fld id="{7716BE6B-2CD1-C04E-9AF5-CC9AE2A7EBBD}" type="datetimeFigureOut">
               <a:rPr kumimoji="1" lang="zh-CN" altLang="en-US" smtClean="0"/>
+              <a:t>2024/3/4</a:t>
             </a:fld>
             <a:endParaRPr kumimoji="1" lang="zh-CN" altLang="en-US"/>
           </a:p>
@@ -267,7 +273,6 @@
               <a:rPr kumimoji="1" lang="zh-CN" altLang="en-US"/>
               <a:t>单击此处编辑母版文本样式</a:t>
             </a:r>
-            <a:endParaRPr kumimoji="1" lang="zh-CN" altLang="en-US"/>
           </a:p>
           <a:p>
             <a:pPr lvl="1"/>
@@ -275,7 +280,6 @@
               <a:rPr kumimoji="1" lang="zh-CN" altLang="en-US"/>
               <a:t>二级</a:t>
             </a:r>
-            <a:endParaRPr kumimoji="1" lang="zh-CN" altLang="en-US"/>
           </a:p>
           <a:p>
             <a:pPr lvl="2"/>
@@ -283,7 +287,6 @@
               <a:rPr kumimoji="1" lang="zh-CN" altLang="en-US"/>
               <a:t>三级</a:t>
             </a:r>
-            <a:endParaRPr kumimoji="1" lang="zh-CN" altLang="en-US"/>
           </a:p>
           <a:p>
             <a:pPr lvl="3"/>
@@ -291,7 +294,6 @@
               <a:rPr kumimoji="1" lang="zh-CN" altLang="en-US"/>
               <a:t>四级</a:t>
             </a:r>
-            <a:endParaRPr kumimoji="1" lang="zh-CN" altLang="en-US"/>
           </a:p>
           <a:p>
             <a:pPr lvl="4"/>
@@ -299,7 +301,6 @@
               <a:rPr kumimoji="1" lang="zh-CN" altLang="en-US"/>
               <a:t>五级</a:t>
             </a:r>
-            <a:endParaRPr kumimoji="1" lang="zh-CN" altLang="en-US"/>
           </a:p>
         </p:txBody>
       </p:sp>
@@ -363,6 +364,7 @@
           <a:p>
             <a:fld id="{150BDD6E-620C-0B49-982B-31086C8A8455}" type="slidenum">
               <a:rPr kumimoji="1" lang="zh-CN" altLang="en-US" smtClean="0"/>
+              <a:t>‹#›</a:t>
             </a:fld>
             <a:endParaRPr kumimoji="1" lang="zh-CN" altLang="en-US"/>
           </a:p>
@@ -511,7 +513,6 @@
               <a:rPr kumimoji="1" lang="zh-CN" altLang="en-US"/>
               <a:t>单击此处编辑母版标题样式</a:t>
             </a:r>
-            <a:endParaRPr kumimoji="1" lang="zh-CN" altLang="en-US"/>
           </a:p>
         </p:txBody>
       </p:sp>
@@ -576,7 +577,6 @@
               <a:rPr kumimoji="1" lang="zh-CN" altLang="en-US"/>
               <a:t>单击此处编辑母版副标题样式</a:t>
             </a:r>
-            <a:endParaRPr kumimoji="1" lang="zh-CN" altLang="en-US"/>
           </a:p>
         </p:txBody>
       </p:sp>
@@ -597,6 +597,7 @@
           <a:p>
             <a:fld id="{F12C73A2-79A2-FF47-AE98-0E0281E6DC1A}" type="datetimeFigureOut">
               <a:rPr kumimoji="1" lang="zh-CN" altLang="en-US" smtClean="0"/>
+              <a:t>2024/3/4</a:t>
             </a:fld>
             <a:endParaRPr kumimoji="1" lang="zh-CN" altLang="en-US"/>
           </a:p>
@@ -638,6 +639,7 @@
           <a:p>
             <a:fld id="{20364DC8-64AD-F644-B4F9-F8048085E0CF}" type="slidenum">
               <a:rPr kumimoji="1" lang="zh-CN" altLang="en-US" smtClean="0"/>
+              <a:t>‹#›</a:t>
             </a:fld>
             <a:endParaRPr kumimoji="1" lang="zh-CN" altLang="en-US"/>
           </a:p>
@@ -648,13 +650,13 @@
   <p:clrMapOvr>
     <a:masterClrMapping/>
   </p:clrMapOvr>
-  <mc:AlternateContent xmlns:mc="http://schemas.openxmlformats.org/markup-compatibility/2006">
-    <mc:Choice xmlns:p14="http://schemas.microsoft.com/office/powerpoint/2010/main" Requires="p14">
+  <mc:AlternateContent xmlns:mc="http://schemas.openxmlformats.org/markup-compatibility/2006" xmlns:p14="http://schemas.microsoft.com/office/powerpoint/2010/main">
+    <mc:Choice Requires="p14">
       <p:transition spd="slow" p14:dur="1500" advTm="2000">
         <p:random/>
       </p:transition>
     </mc:Choice>
-    <mc:Fallback>
+    <mc:Fallback xmlns="">
       <p:transition spd="slow" advTm="2000">
         <p:random/>
       </p:transition>
@@ -708,7 +710,6 @@
               <a:rPr kumimoji="1" lang="zh-CN" altLang="en-US"/>
               <a:t>单击此处编辑母版标题样式</a:t>
             </a:r>
-            <a:endParaRPr kumimoji="1" lang="zh-CN" altLang="en-US"/>
           </a:p>
         </p:txBody>
       </p:sp>
@@ -835,7 +836,6 @@
               <a:rPr kumimoji="1" lang="zh-CN" altLang="en-US"/>
               <a:t>单击此处编辑母版文本样式</a:t>
             </a:r>
-            <a:endParaRPr kumimoji="1" lang="zh-CN" altLang="en-US"/>
           </a:p>
         </p:txBody>
       </p:sp>
@@ -856,6 +856,7 @@
           <a:p>
             <a:fld id="{F12C73A2-79A2-FF47-AE98-0E0281E6DC1A}" type="datetimeFigureOut">
               <a:rPr kumimoji="1" lang="zh-CN" altLang="en-US" smtClean="0"/>
+              <a:t>2024/3/4</a:t>
             </a:fld>
             <a:endParaRPr kumimoji="1" lang="zh-CN" altLang="en-US"/>
           </a:p>
@@ -897,6 +898,7 @@
           <a:p>
             <a:fld id="{20364DC8-64AD-F644-B4F9-F8048085E0CF}" type="slidenum">
               <a:rPr kumimoji="1" lang="zh-CN" altLang="en-US" smtClean="0"/>
+              <a:t>‹#›</a:t>
             </a:fld>
             <a:endParaRPr kumimoji="1" lang="zh-CN" altLang="en-US"/>
           </a:p>
@@ -907,13 +909,13 @@
   <p:clrMapOvr>
     <a:masterClrMapping/>
   </p:clrMapOvr>
-  <mc:AlternateContent xmlns:mc="http://schemas.openxmlformats.org/markup-compatibility/2006">
-    <mc:Choice xmlns:p14="http://schemas.microsoft.com/office/powerpoint/2010/main" Requires="p14">
+  <mc:AlternateContent xmlns:mc="http://schemas.openxmlformats.org/markup-compatibility/2006" xmlns:p14="http://schemas.microsoft.com/office/powerpoint/2010/main">
+    <mc:Choice Requires="p14">
       <p:transition spd="slow" p14:dur="1500" advTm="2000">
         <p:random/>
       </p:transition>
     </mc:Choice>
-    <mc:Fallback>
+    <mc:Fallback xmlns="">
       <p:transition spd="slow" advTm="2000">
         <p:random/>
       </p:transition>
@@ -958,7 +960,6 @@
               <a:rPr kumimoji="1" lang="zh-CN" altLang="en-US"/>
               <a:t>单击此处编辑母版标题样式</a:t>
             </a:r>
-            <a:endParaRPr kumimoji="1" lang="zh-CN" altLang="en-US"/>
           </a:p>
         </p:txBody>
       </p:sp>
@@ -982,7 +983,6 @@
               <a:rPr kumimoji="1" lang="zh-CN" altLang="en-US"/>
               <a:t>单击此处编辑母版文本样式</a:t>
             </a:r>
-            <a:endParaRPr kumimoji="1" lang="zh-CN" altLang="en-US"/>
           </a:p>
           <a:p>
             <a:pPr lvl="1"/>
@@ -990,7 +990,6 @@
               <a:rPr kumimoji="1" lang="zh-CN" altLang="en-US"/>
               <a:t>二级</a:t>
             </a:r>
-            <a:endParaRPr kumimoji="1" lang="zh-CN" altLang="en-US"/>
           </a:p>
           <a:p>
             <a:pPr lvl="2"/>
@@ -998,7 +997,6 @@
               <a:rPr kumimoji="1" lang="zh-CN" altLang="en-US"/>
               <a:t>三级</a:t>
             </a:r>
-            <a:endParaRPr kumimoji="1" lang="zh-CN" altLang="en-US"/>
           </a:p>
           <a:p>
             <a:pPr lvl="3"/>
@@ -1006,7 +1004,6 @@
               <a:rPr kumimoji="1" lang="zh-CN" altLang="en-US"/>
               <a:t>四级</a:t>
             </a:r>
-            <a:endParaRPr kumimoji="1" lang="zh-CN" altLang="en-US"/>
           </a:p>
           <a:p>
             <a:pPr lvl="4"/>
@@ -1014,7 +1011,6 @@
               <a:rPr kumimoji="1" lang="zh-CN" altLang="en-US"/>
               <a:t>五级</a:t>
             </a:r>
-            <a:endParaRPr kumimoji="1" lang="zh-CN" altLang="en-US"/>
           </a:p>
         </p:txBody>
       </p:sp>
@@ -1035,6 +1031,7 @@
           <a:p>
             <a:fld id="{F12C73A2-79A2-FF47-AE98-0E0281E6DC1A}" type="datetimeFigureOut">
               <a:rPr kumimoji="1" lang="zh-CN" altLang="en-US" smtClean="0"/>
+              <a:t>2024/3/4</a:t>
             </a:fld>
             <a:endParaRPr kumimoji="1" lang="zh-CN" altLang="en-US"/>
           </a:p>
@@ -1076,6 +1073,7 @@
           <a:p>
             <a:fld id="{20364DC8-64AD-F644-B4F9-F8048085E0CF}" type="slidenum">
               <a:rPr kumimoji="1" lang="zh-CN" altLang="en-US" smtClean="0"/>
+              <a:t>‹#›</a:t>
             </a:fld>
             <a:endParaRPr kumimoji="1" lang="zh-CN" altLang="en-US"/>
           </a:p>
@@ -1086,13 +1084,13 @@
   <p:clrMapOvr>
     <a:masterClrMapping/>
   </p:clrMapOvr>
-  <mc:AlternateContent xmlns:mc="http://schemas.openxmlformats.org/markup-compatibility/2006">
-    <mc:Choice xmlns:p14="http://schemas.microsoft.com/office/powerpoint/2010/main" Requires="p14">
+  <mc:AlternateContent xmlns:mc="http://schemas.openxmlformats.org/markup-compatibility/2006" xmlns:p14="http://schemas.microsoft.com/office/powerpoint/2010/main">
+    <mc:Choice Requires="p14">
       <p:transition spd="slow" p14:dur="1500" advTm="2000">
         <p:random/>
       </p:transition>
     </mc:Choice>
-    <mc:Fallback>
+    <mc:Fallback xmlns="">
       <p:transition spd="slow" advTm="2000">
         <p:random/>
       </p:transition>
@@ -1142,7 +1140,6 @@
               <a:rPr kumimoji="1" lang="zh-CN" altLang="en-US"/>
               <a:t>单击此处编辑母版标题样式</a:t>
             </a:r>
-            <a:endParaRPr kumimoji="1" lang="zh-CN" altLang="en-US"/>
           </a:p>
         </p:txBody>
       </p:sp>
@@ -1171,7 +1168,6 @@
               <a:rPr kumimoji="1" lang="zh-CN" altLang="en-US"/>
               <a:t>单击此处编辑母版文本样式</a:t>
             </a:r>
-            <a:endParaRPr kumimoji="1" lang="zh-CN" altLang="en-US"/>
           </a:p>
           <a:p>
             <a:pPr lvl="1"/>
@@ -1179,7 +1175,6 @@
               <a:rPr kumimoji="1" lang="zh-CN" altLang="en-US"/>
               <a:t>二级</a:t>
             </a:r>
-            <a:endParaRPr kumimoji="1" lang="zh-CN" altLang="en-US"/>
           </a:p>
           <a:p>
             <a:pPr lvl="2"/>
@@ -1187,7 +1182,6 @@
               <a:rPr kumimoji="1" lang="zh-CN" altLang="en-US"/>
               <a:t>三级</a:t>
             </a:r>
-            <a:endParaRPr kumimoji="1" lang="zh-CN" altLang="en-US"/>
           </a:p>
           <a:p>
             <a:pPr lvl="3"/>
@@ -1195,7 +1189,6 @@
               <a:rPr kumimoji="1" lang="zh-CN" altLang="en-US"/>
               <a:t>四级</a:t>
             </a:r>
-            <a:endParaRPr kumimoji="1" lang="zh-CN" altLang="en-US"/>
           </a:p>
           <a:p>
             <a:pPr lvl="4"/>
@@ -1203,7 +1196,6 @@
               <a:rPr kumimoji="1" lang="zh-CN" altLang="en-US"/>
               <a:t>五级</a:t>
             </a:r>
-            <a:endParaRPr kumimoji="1" lang="zh-CN" altLang="en-US"/>
           </a:p>
         </p:txBody>
       </p:sp>
@@ -1224,6 +1216,7 @@
           <a:p>
             <a:fld id="{F12C73A2-79A2-FF47-AE98-0E0281E6DC1A}" type="datetimeFigureOut">
               <a:rPr kumimoji="1" lang="zh-CN" altLang="en-US" smtClean="0"/>
+              <a:t>2024/3/4</a:t>
             </a:fld>
             <a:endParaRPr kumimoji="1" lang="zh-CN" altLang="en-US"/>
           </a:p>
@@ -1265,6 +1258,7 @@
           <a:p>
             <a:fld id="{20364DC8-64AD-F644-B4F9-F8048085E0CF}" type="slidenum">
               <a:rPr kumimoji="1" lang="zh-CN" altLang="en-US" smtClean="0"/>
+              <a:t>‹#›</a:t>
             </a:fld>
             <a:endParaRPr kumimoji="1" lang="zh-CN" altLang="en-US"/>
           </a:p>
@@ -1275,13 +1269,13 @@
   <p:clrMapOvr>
     <a:masterClrMapping/>
   </p:clrMapOvr>
-  <mc:AlternateContent xmlns:mc="http://schemas.openxmlformats.org/markup-compatibility/2006">
-    <mc:Choice xmlns:p14="http://schemas.microsoft.com/office/powerpoint/2010/main" Requires="p14">
+  <mc:AlternateContent xmlns:mc="http://schemas.openxmlformats.org/markup-compatibility/2006" xmlns:p14="http://schemas.microsoft.com/office/powerpoint/2010/main">
+    <mc:Choice Requires="p14">
       <p:transition spd="slow" p14:dur="1500" advTm="2000">
         <p:random/>
       </p:transition>
     </mc:Choice>
-    <mc:Fallback>
+    <mc:Fallback xmlns="">
       <p:transition spd="slow" advTm="2000">
         <p:random/>
       </p:transition>
@@ -1312,13 +1306,13 @@
   <p:clrMapOvr>
     <a:masterClrMapping/>
   </p:clrMapOvr>
-  <mc:AlternateContent xmlns:mc="http://schemas.openxmlformats.org/markup-compatibility/2006">
-    <mc:Choice xmlns:p14="http://schemas.microsoft.com/office/powerpoint/2010/main" Requires="p14">
+  <mc:AlternateContent xmlns:mc="http://schemas.openxmlformats.org/markup-compatibility/2006" xmlns:p14="http://schemas.microsoft.com/office/powerpoint/2010/main">
+    <mc:Choice Requires="p14">
       <p:transition spd="slow" p14:dur="1500" advTm="2000">
         <p:random/>
       </p:transition>
     </mc:Choice>
-    <mc:Fallback>
+    <mc:Fallback xmlns="">
       <p:transition spd="slow" advTm="2000">
         <p:random/>
       </p:transition>
@@ -1349,13 +1343,13 @@
   <p:clrMapOvr>
     <a:masterClrMapping/>
   </p:clrMapOvr>
-  <mc:AlternateContent xmlns:mc="http://schemas.openxmlformats.org/markup-compatibility/2006">
-    <mc:Choice xmlns:p14="http://schemas.microsoft.com/office/powerpoint/2010/main" Requires="p14">
+  <mc:AlternateContent xmlns:mc="http://schemas.openxmlformats.org/markup-compatibility/2006" xmlns:p14="http://schemas.microsoft.com/office/powerpoint/2010/main">
+    <mc:Choice Requires="p14">
       <p:transition spd="slow" p14:dur="1500" advTm="2000">
         <p:random/>
       </p:transition>
     </mc:Choice>
-    <mc:Fallback>
+    <mc:Fallback xmlns="">
       <p:transition spd="slow" advTm="2000">
         <p:random/>
       </p:transition>
@@ -1386,13 +1380,13 @@
   <p:clrMapOvr>
     <a:masterClrMapping/>
   </p:clrMapOvr>
-  <mc:AlternateContent xmlns:mc="http://schemas.openxmlformats.org/markup-compatibility/2006">
-    <mc:Choice xmlns:p14="http://schemas.microsoft.com/office/powerpoint/2010/main" Requires="p14">
+  <mc:AlternateContent xmlns:mc="http://schemas.openxmlformats.org/markup-compatibility/2006" xmlns:p14="http://schemas.microsoft.com/office/powerpoint/2010/main">
+    <mc:Choice Requires="p14">
       <p:transition spd="slow" p14:dur="1500" advTm="2000">
         <p:random/>
       </p:transition>
     </mc:Choice>
-    <mc:Fallback>
+    <mc:Fallback xmlns="">
       <p:transition spd="slow" advTm="2000">
         <p:random/>
       </p:transition>
@@ -1423,13 +1417,13 @@
   <p:clrMapOvr>
     <a:masterClrMapping/>
   </p:clrMapOvr>
-  <mc:AlternateContent xmlns:mc="http://schemas.openxmlformats.org/markup-compatibility/2006">
-    <mc:Choice xmlns:p14="http://schemas.microsoft.com/office/powerpoint/2010/main" Requires="p14">
+  <mc:AlternateContent xmlns:mc="http://schemas.openxmlformats.org/markup-compatibility/2006" xmlns:p14="http://schemas.microsoft.com/office/powerpoint/2010/main">
+    <mc:Choice Requires="p14">
       <p:transition spd="slow" p14:dur="1500" advTm="2000">
         <p:random/>
       </p:transition>
     </mc:Choice>
-    <mc:Fallback>
+    <mc:Fallback xmlns="">
       <p:transition spd="slow" advTm="2000">
         <p:random/>
       </p:transition>
@@ -1514,13 +1508,13 @@
   <p:clrMapOvr>
     <a:masterClrMapping/>
   </p:clrMapOvr>
-  <mc:AlternateContent xmlns:mc="http://schemas.openxmlformats.org/markup-compatibility/2006">
-    <mc:Choice xmlns:p14="http://schemas.microsoft.com/office/powerpoint/2010/main" Requires="p14">
+  <mc:AlternateContent xmlns:mc="http://schemas.openxmlformats.org/markup-compatibility/2006" xmlns:p14="http://schemas.microsoft.com/office/powerpoint/2010/main">
+    <mc:Choice Requires="p14">
       <p:transition spd="slow" p14:dur="1500" advTm="2000">
         <p:random/>
       </p:transition>
     </mc:Choice>
-    <mc:Fallback>
+    <mc:Fallback xmlns="">
       <p:transition spd="slow" advTm="2000">
         <p:random/>
       </p:transition>
@@ -1625,13 +1619,13 @@
   <p:clrMapOvr>
     <a:masterClrMapping/>
   </p:clrMapOvr>
-  <mc:AlternateContent xmlns:mc="http://schemas.openxmlformats.org/markup-compatibility/2006">
-    <mc:Choice xmlns:p14="http://schemas.microsoft.com/office/powerpoint/2010/main" Requires="p14">
+  <mc:AlternateContent xmlns:mc="http://schemas.openxmlformats.org/markup-compatibility/2006" xmlns:p14="http://schemas.microsoft.com/office/powerpoint/2010/main">
+    <mc:Choice Requires="p14">
       <p:transition spd="slow" p14:dur="1500" advTm="2000">
         <p:random/>
       </p:transition>
     </mc:Choice>
-    <mc:Fallback>
+    <mc:Fallback xmlns="">
       <p:transition spd="slow" advTm="2000">
         <p:random/>
       </p:transition>
@@ -1684,7 +1678,6 @@
               <a:rPr lang="zh-CN" altLang="en-US"/>
               <a:t>单击此处编辑母版标题样式</a:t>
             </a:r>
-            <a:endParaRPr lang="zh-CN" altLang="en-US"/>
           </a:p>
         </p:txBody>
       </p:sp>
@@ -1716,7 +1709,6 @@
               <a:rPr lang="zh-CN" altLang="en-US"/>
               <a:t>单击此处编辑母版文本样式</a:t>
             </a:r>
-            <a:endParaRPr lang="zh-CN" altLang="en-US"/>
           </a:p>
           <a:p>
             <a:pPr lvl="1"/>
@@ -1724,7 +1716,6 @@
               <a:rPr lang="zh-CN" altLang="en-US"/>
               <a:t>第二级</a:t>
             </a:r>
-            <a:endParaRPr lang="zh-CN" altLang="en-US"/>
           </a:p>
           <a:p>
             <a:pPr lvl="2"/>
@@ -1732,7 +1723,6 @@
               <a:rPr lang="zh-CN" altLang="en-US"/>
               <a:t>第三级</a:t>
             </a:r>
-            <a:endParaRPr lang="zh-CN" altLang="en-US"/>
           </a:p>
           <a:p>
             <a:pPr lvl="3"/>
@@ -1740,7 +1730,6 @@
               <a:rPr lang="zh-CN" altLang="en-US"/>
               <a:t>第四级</a:t>
             </a:r>
-            <a:endParaRPr lang="zh-CN" altLang="en-US"/>
           </a:p>
           <a:p>
             <a:pPr lvl="4"/>
@@ -1748,7 +1737,6 @@
               <a:rPr lang="zh-CN" altLang="en-US"/>
               <a:t>第五级</a:t>
             </a:r>
-            <a:endParaRPr lang="zh-CN" altLang="en-US"/>
           </a:p>
         </p:txBody>
       </p:sp>
@@ -1777,6 +1765,7 @@
           <a:p>
             <a:fld id="{2E3AAC11-D570-4EA9-AFC0-30FB72BA45EB}" type="datetimeFigureOut">
               <a:rPr lang="zh-CN" altLang="en-US" smtClean="0"/>
+              <a:t>2024/3/4</a:t>
             </a:fld>
             <a:endParaRPr lang="zh-CN" altLang="en-US"/>
           </a:p>
@@ -1834,6 +1823,7 @@
           <a:p>
             <a:fld id="{55ECCFAA-F4FB-487C-9F1E-C8836D0C3DC9}" type="slidenum">
               <a:rPr lang="zh-CN" altLang="en-US" smtClean="0"/>
+              <a:t>‹#›</a:t>
             </a:fld>
             <a:endParaRPr lang="zh-CN" altLang="en-US"/>
           </a:p>
@@ -1883,7 +1873,6 @@
               <a:rPr kumimoji="1" lang="zh-CN" altLang="en-US"/>
               <a:t>单击此处编辑母版标题样式</a:t>
             </a:r>
-            <a:endParaRPr kumimoji="1" lang="zh-CN" altLang="en-US"/>
           </a:p>
         </p:txBody>
       </p:sp>
@@ -1907,7 +1896,6 @@
               <a:rPr kumimoji="1" lang="zh-CN" altLang="en-US"/>
               <a:t>单击此处编辑母版文本样式</a:t>
             </a:r>
-            <a:endParaRPr kumimoji="1" lang="zh-CN" altLang="en-US"/>
           </a:p>
           <a:p>
             <a:pPr lvl="1"/>
@@ -1915,7 +1903,6 @@
               <a:rPr kumimoji="1" lang="zh-CN" altLang="en-US"/>
               <a:t>二级</a:t>
             </a:r>
-            <a:endParaRPr kumimoji="1" lang="zh-CN" altLang="en-US"/>
           </a:p>
           <a:p>
             <a:pPr lvl="2"/>
@@ -1923,7 +1910,6 @@
               <a:rPr kumimoji="1" lang="zh-CN" altLang="en-US"/>
               <a:t>三级</a:t>
             </a:r>
-            <a:endParaRPr kumimoji="1" lang="zh-CN" altLang="en-US"/>
           </a:p>
           <a:p>
             <a:pPr lvl="3"/>
@@ -1931,7 +1917,6 @@
               <a:rPr kumimoji="1" lang="zh-CN" altLang="en-US"/>
               <a:t>四级</a:t>
             </a:r>
-            <a:endParaRPr kumimoji="1" lang="zh-CN" altLang="en-US"/>
           </a:p>
           <a:p>
             <a:pPr lvl="4"/>
@@ -1939,7 +1924,6 @@
               <a:rPr kumimoji="1" lang="zh-CN" altLang="en-US"/>
               <a:t>五级</a:t>
             </a:r>
-            <a:endParaRPr kumimoji="1" lang="zh-CN" altLang="en-US"/>
           </a:p>
         </p:txBody>
       </p:sp>
@@ -1960,6 +1944,7 @@
           <a:p>
             <a:fld id="{F12C73A2-79A2-FF47-AE98-0E0281E6DC1A}" type="datetimeFigureOut">
               <a:rPr kumimoji="1" lang="zh-CN" altLang="en-US" smtClean="0"/>
+              <a:t>2024/3/4</a:t>
             </a:fld>
             <a:endParaRPr kumimoji="1" lang="zh-CN" altLang="en-US"/>
           </a:p>
@@ -2001,6 +1986,7 @@
           <a:p>
             <a:fld id="{20364DC8-64AD-F644-B4F9-F8048085E0CF}" type="slidenum">
               <a:rPr kumimoji="1" lang="zh-CN" altLang="en-US" smtClean="0"/>
+              <a:t>‹#›</a:t>
             </a:fld>
             <a:endParaRPr kumimoji="1" lang="zh-CN" altLang="en-US"/>
           </a:p>
@@ -2011,13 +1997,13 @@
   <p:clrMapOvr>
     <a:masterClrMapping/>
   </p:clrMapOvr>
-  <mc:AlternateContent xmlns:mc="http://schemas.openxmlformats.org/markup-compatibility/2006">
-    <mc:Choice xmlns:p14="http://schemas.microsoft.com/office/powerpoint/2010/main" Requires="p14">
+  <mc:AlternateContent xmlns:mc="http://schemas.openxmlformats.org/markup-compatibility/2006" xmlns:p14="http://schemas.microsoft.com/office/powerpoint/2010/main">
+    <mc:Choice Requires="p14">
       <p:transition spd="slow" p14:dur="1500" advTm="2000">
         <p:random/>
       </p:transition>
     </mc:Choice>
-    <mc:Fallback>
+    <mc:Fallback xmlns="">
       <p:transition spd="slow" advTm="2000">
         <p:random/>
       </p:transition>
@@ -2070,7 +2056,6 @@
               <a:rPr lang="zh-CN" altLang="en-US"/>
               <a:t>单击此处编辑母版标题样式</a:t>
             </a:r>
-            <a:endParaRPr lang="zh-CN" altLang="en-US"/>
           </a:p>
         </p:txBody>
       </p:sp>
@@ -2102,7 +2087,6 @@
               <a:rPr lang="zh-CN" altLang="en-US"/>
               <a:t>单击此处编辑母版文本样式</a:t>
             </a:r>
-            <a:endParaRPr lang="zh-CN" altLang="en-US"/>
           </a:p>
           <a:p>
             <a:pPr lvl="1"/>
@@ -2110,7 +2094,6 @@
               <a:rPr lang="zh-CN" altLang="en-US"/>
               <a:t>第二级</a:t>
             </a:r>
-            <a:endParaRPr lang="zh-CN" altLang="en-US"/>
           </a:p>
           <a:p>
             <a:pPr lvl="2"/>
@@ -2118,7 +2101,6 @@
               <a:rPr lang="zh-CN" altLang="en-US"/>
               <a:t>第三级</a:t>
             </a:r>
-            <a:endParaRPr lang="zh-CN" altLang="en-US"/>
           </a:p>
           <a:p>
             <a:pPr lvl="3"/>
@@ -2126,7 +2108,6 @@
               <a:rPr lang="zh-CN" altLang="en-US"/>
               <a:t>第四级</a:t>
             </a:r>
-            <a:endParaRPr lang="zh-CN" altLang="en-US"/>
           </a:p>
           <a:p>
             <a:pPr lvl="4"/>
@@ -2134,7 +2115,6 @@
               <a:rPr lang="zh-CN" altLang="en-US"/>
               <a:t>第五级</a:t>
             </a:r>
-            <a:endParaRPr lang="zh-CN" altLang="en-US"/>
           </a:p>
         </p:txBody>
       </p:sp>
@@ -2163,6 +2143,7 @@
           <a:p>
             <a:fld id="{2E3AAC11-D570-4EA9-AFC0-30FB72BA45EB}" type="datetimeFigureOut">
               <a:rPr lang="zh-CN" altLang="en-US" smtClean="0"/>
+              <a:t>2024/3/4</a:t>
             </a:fld>
             <a:endParaRPr lang="zh-CN" altLang="en-US"/>
           </a:p>
@@ -2220,6 +2201,7 @@
           <a:p>
             <a:fld id="{55ECCFAA-F4FB-487C-9F1E-C8836D0C3DC9}" type="slidenum">
               <a:rPr lang="zh-CN" altLang="en-US" smtClean="0"/>
+              <a:t>‹#›</a:t>
             </a:fld>
             <a:endParaRPr lang="zh-CN" altLang="en-US"/>
           </a:p>
@@ -2303,7 +2285,6 @@
               <a:rPr kumimoji="1" lang="zh-CN" altLang="en-US"/>
               <a:t>单击此处编辑母版标题样式</a:t>
             </a:r>
-            <a:endParaRPr kumimoji="1" lang="zh-CN" altLang="en-US"/>
           </a:p>
         </p:txBody>
       </p:sp>
@@ -2423,7 +2404,6 @@
               <a:rPr kumimoji="1" lang="zh-CN" altLang="en-US"/>
               <a:t>单击此处编辑母版文本样式</a:t>
             </a:r>
-            <a:endParaRPr kumimoji="1" lang="zh-CN" altLang="en-US"/>
           </a:p>
         </p:txBody>
       </p:sp>
@@ -2444,6 +2424,7 @@
           <a:p>
             <a:fld id="{F12C73A2-79A2-FF47-AE98-0E0281E6DC1A}" type="datetimeFigureOut">
               <a:rPr kumimoji="1" lang="zh-CN" altLang="en-US" smtClean="0"/>
+              <a:t>2024/3/4</a:t>
             </a:fld>
             <a:endParaRPr kumimoji="1" lang="zh-CN" altLang="en-US"/>
           </a:p>
@@ -2485,6 +2466,7 @@
           <a:p>
             <a:fld id="{20364DC8-64AD-F644-B4F9-F8048085E0CF}" type="slidenum">
               <a:rPr kumimoji="1" lang="zh-CN" altLang="en-US" smtClean="0"/>
+              <a:t>‹#›</a:t>
             </a:fld>
             <a:endParaRPr kumimoji="1" lang="zh-CN" altLang="en-US"/>
           </a:p>
@@ -2495,13 +2477,13 @@
   <p:clrMapOvr>
     <a:masterClrMapping/>
   </p:clrMapOvr>
-  <mc:AlternateContent xmlns:mc="http://schemas.openxmlformats.org/markup-compatibility/2006">
-    <mc:Choice xmlns:p14="http://schemas.microsoft.com/office/powerpoint/2010/main" Requires="p14">
+  <mc:AlternateContent xmlns:mc="http://schemas.openxmlformats.org/markup-compatibility/2006" xmlns:p14="http://schemas.microsoft.com/office/powerpoint/2010/main">
+    <mc:Choice Requires="p14">
       <p:transition spd="slow" p14:dur="1500" advTm="2000">
         <p:random/>
       </p:transition>
     </mc:Choice>
-    <mc:Fallback>
+    <mc:Fallback xmlns="">
       <p:transition spd="slow" advTm="2000">
         <p:random/>
       </p:transition>
@@ -2546,7 +2528,6 @@
               <a:rPr kumimoji="1" lang="zh-CN" altLang="en-US"/>
               <a:t>单击此处编辑母版标题样式</a:t>
             </a:r>
-            <a:endParaRPr kumimoji="1" lang="zh-CN" altLang="en-US"/>
           </a:p>
         </p:txBody>
       </p:sp>
@@ -2575,7 +2556,6 @@
               <a:rPr kumimoji="1" lang="zh-CN" altLang="en-US"/>
               <a:t>单击此处编辑母版文本样式</a:t>
             </a:r>
-            <a:endParaRPr kumimoji="1" lang="zh-CN" altLang="en-US"/>
           </a:p>
           <a:p>
             <a:pPr lvl="1"/>
@@ -2583,7 +2563,6 @@
               <a:rPr kumimoji="1" lang="zh-CN" altLang="en-US"/>
               <a:t>二级</a:t>
             </a:r>
-            <a:endParaRPr kumimoji="1" lang="zh-CN" altLang="en-US"/>
           </a:p>
           <a:p>
             <a:pPr lvl="2"/>
@@ -2591,7 +2570,6 @@
               <a:rPr kumimoji="1" lang="zh-CN" altLang="en-US"/>
               <a:t>三级</a:t>
             </a:r>
-            <a:endParaRPr kumimoji="1" lang="zh-CN" altLang="en-US"/>
           </a:p>
           <a:p>
             <a:pPr lvl="3"/>
@@ -2599,7 +2577,6 @@
               <a:rPr kumimoji="1" lang="zh-CN" altLang="en-US"/>
               <a:t>四级</a:t>
             </a:r>
-            <a:endParaRPr kumimoji="1" lang="zh-CN" altLang="en-US"/>
           </a:p>
           <a:p>
             <a:pPr lvl="4"/>
@@ -2607,7 +2584,6 @@
               <a:rPr kumimoji="1" lang="zh-CN" altLang="en-US"/>
               <a:t>五级</a:t>
             </a:r>
-            <a:endParaRPr kumimoji="1" lang="zh-CN" altLang="en-US"/>
           </a:p>
         </p:txBody>
       </p:sp>
@@ -2636,7 +2612,6 @@
               <a:rPr kumimoji="1" lang="zh-CN" altLang="en-US"/>
               <a:t>单击此处编辑母版文本样式</a:t>
             </a:r>
-            <a:endParaRPr kumimoji="1" lang="zh-CN" altLang="en-US"/>
           </a:p>
           <a:p>
             <a:pPr lvl="1"/>
@@ -2644,7 +2619,6 @@
               <a:rPr kumimoji="1" lang="zh-CN" altLang="en-US"/>
               <a:t>二级</a:t>
             </a:r>
-            <a:endParaRPr kumimoji="1" lang="zh-CN" altLang="en-US"/>
           </a:p>
           <a:p>
             <a:pPr lvl="2"/>
@@ -2652,7 +2626,6 @@
               <a:rPr kumimoji="1" lang="zh-CN" altLang="en-US"/>
               <a:t>三级</a:t>
             </a:r>
-            <a:endParaRPr kumimoji="1" lang="zh-CN" altLang="en-US"/>
           </a:p>
           <a:p>
             <a:pPr lvl="3"/>
@@ -2660,7 +2633,6 @@
               <a:rPr kumimoji="1" lang="zh-CN" altLang="en-US"/>
               <a:t>四级</a:t>
             </a:r>
-            <a:endParaRPr kumimoji="1" lang="zh-CN" altLang="en-US"/>
           </a:p>
           <a:p>
             <a:pPr lvl="4"/>
@@ -2668,7 +2640,6 @@
               <a:rPr kumimoji="1" lang="zh-CN" altLang="en-US"/>
               <a:t>五级</a:t>
             </a:r>
-            <a:endParaRPr kumimoji="1" lang="zh-CN" altLang="en-US"/>
           </a:p>
         </p:txBody>
       </p:sp>
@@ -2689,6 +2660,7 @@
           <a:p>
             <a:fld id="{F12C73A2-79A2-FF47-AE98-0E0281E6DC1A}" type="datetimeFigureOut">
               <a:rPr kumimoji="1" lang="zh-CN" altLang="en-US" smtClean="0"/>
+              <a:t>2024/3/4</a:t>
             </a:fld>
             <a:endParaRPr kumimoji="1" lang="zh-CN" altLang="en-US"/>
           </a:p>
@@ -2730,6 +2702,7 @@
           <a:p>
             <a:fld id="{20364DC8-64AD-F644-B4F9-F8048085E0CF}" type="slidenum">
               <a:rPr kumimoji="1" lang="zh-CN" altLang="en-US" smtClean="0"/>
+              <a:t>‹#›</a:t>
             </a:fld>
             <a:endParaRPr kumimoji="1" lang="zh-CN" altLang="en-US"/>
           </a:p>
@@ -2740,13 +2713,13 @@
   <p:clrMapOvr>
     <a:masterClrMapping/>
   </p:clrMapOvr>
-  <mc:AlternateContent xmlns:mc="http://schemas.openxmlformats.org/markup-compatibility/2006">
-    <mc:Choice xmlns:p14="http://schemas.microsoft.com/office/powerpoint/2010/main" Requires="p14">
+  <mc:AlternateContent xmlns:mc="http://schemas.openxmlformats.org/markup-compatibility/2006" xmlns:p14="http://schemas.microsoft.com/office/powerpoint/2010/main">
+    <mc:Choice Requires="p14">
       <p:transition spd="slow" p14:dur="1500" advTm="2000">
         <p:random/>
       </p:transition>
     </mc:Choice>
-    <mc:Fallback>
+    <mc:Fallback xmlns="">
       <p:transition spd="slow" advTm="2000">
         <p:random/>
       </p:transition>
@@ -2796,7 +2769,6 @@
               <a:rPr kumimoji="1" lang="zh-CN" altLang="en-US"/>
               <a:t>单击此处编辑母版标题样式</a:t>
             </a:r>
-            <a:endParaRPr kumimoji="1" lang="zh-CN" altLang="en-US"/>
           </a:p>
         </p:txBody>
       </p:sp>
@@ -2862,7 +2834,6 @@
               <a:rPr kumimoji="1" lang="zh-CN" altLang="en-US"/>
               <a:t>单击此处编辑母版文本样式</a:t>
             </a:r>
-            <a:endParaRPr kumimoji="1" lang="zh-CN" altLang="en-US"/>
           </a:p>
         </p:txBody>
       </p:sp>
@@ -2891,7 +2862,6 @@
               <a:rPr kumimoji="1" lang="zh-CN" altLang="en-US"/>
               <a:t>单击此处编辑母版文本样式</a:t>
             </a:r>
-            <a:endParaRPr kumimoji="1" lang="zh-CN" altLang="en-US"/>
           </a:p>
           <a:p>
             <a:pPr lvl="1"/>
@@ -2899,7 +2869,6 @@
               <a:rPr kumimoji="1" lang="zh-CN" altLang="en-US"/>
               <a:t>二级</a:t>
             </a:r>
-            <a:endParaRPr kumimoji="1" lang="zh-CN" altLang="en-US"/>
           </a:p>
           <a:p>
             <a:pPr lvl="2"/>
@@ -2907,7 +2876,6 @@
               <a:rPr kumimoji="1" lang="zh-CN" altLang="en-US"/>
               <a:t>三级</a:t>
             </a:r>
-            <a:endParaRPr kumimoji="1" lang="zh-CN" altLang="en-US"/>
           </a:p>
           <a:p>
             <a:pPr lvl="3"/>
@@ -2915,7 +2883,6 @@
               <a:rPr kumimoji="1" lang="zh-CN" altLang="en-US"/>
               <a:t>四级</a:t>
             </a:r>
-            <a:endParaRPr kumimoji="1" lang="zh-CN" altLang="en-US"/>
           </a:p>
           <a:p>
             <a:pPr lvl="4"/>
@@ -2923,7 +2890,6 @@
               <a:rPr kumimoji="1" lang="zh-CN" altLang="en-US"/>
               <a:t>五级</a:t>
             </a:r>
-            <a:endParaRPr kumimoji="1" lang="zh-CN" altLang="en-US"/>
           </a:p>
         </p:txBody>
       </p:sp>
@@ -2989,7 +2955,6 @@
               <a:rPr kumimoji="1" lang="zh-CN" altLang="en-US"/>
               <a:t>单击此处编辑母版文本样式</a:t>
             </a:r>
-            <a:endParaRPr kumimoji="1" lang="zh-CN" altLang="en-US"/>
           </a:p>
         </p:txBody>
       </p:sp>
@@ -3018,7 +2983,6 @@
               <a:rPr kumimoji="1" lang="zh-CN" altLang="en-US"/>
               <a:t>单击此处编辑母版文本样式</a:t>
             </a:r>
-            <a:endParaRPr kumimoji="1" lang="zh-CN" altLang="en-US"/>
           </a:p>
           <a:p>
             <a:pPr lvl="1"/>
@@ -3026,7 +2990,6 @@
               <a:rPr kumimoji="1" lang="zh-CN" altLang="en-US"/>
               <a:t>二级</a:t>
             </a:r>
-            <a:endParaRPr kumimoji="1" lang="zh-CN" altLang="en-US"/>
           </a:p>
           <a:p>
             <a:pPr lvl="2"/>
@@ -3034,7 +2997,6 @@
               <a:rPr kumimoji="1" lang="zh-CN" altLang="en-US"/>
               <a:t>三级</a:t>
             </a:r>
-            <a:endParaRPr kumimoji="1" lang="zh-CN" altLang="en-US"/>
           </a:p>
           <a:p>
             <a:pPr lvl="3"/>
@@ -3042,7 +3004,6 @@
               <a:rPr kumimoji="1" lang="zh-CN" altLang="en-US"/>
               <a:t>四级</a:t>
             </a:r>
-            <a:endParaRPr kumimoji="1" lang="zh-CN" altLang="en-US"/>
           </a:p>
           <a:p>
             <a:pPr lvl="4"/>
@@ -3050,7 +3011,6 @@
               <a:rPr kumimoji="1" lang="zh-CN" altLang="en-US"/>
               <a:t>五级</a:t>
             </a:r>
-            <a:endParaRPr kumimoji="1" lang="zh-CN" altLang="en-US"/>
           </a:p>
         </p:txBody>
       </p:sp>
@@ -3071,6 +3031,7 @@
           <a:p>
             <a:fld id="{F12C73A2-79A2-FF47-AE98-0E0281E6DC1A}" type="datetimeFigureOut">
               <a:rPr kumimoji="1" lang="zh-CN" altLang="en-US" smtClean="0"/>
+              <a:t>2024/3/4</a:t>
             </a:fld>
             <a:endParaRPr kumimoji="1" lang="zh-CN" altLang="en-US"/>
           </a:p>
@@ -3112,6 +3073,7 @@
           <a:p>
             <a:fld id="{20364DC8-64AD-F644-B4F9-F8048085E0CF}" type="slidenum">
               <a:rPr kumimoji="1" lang="zh-CN" altLang="en-US" smtClean="0"/>
+              <a:t>‹#›</a:t>
             </a:fld>
             <a:endParaRPr kumimoji="1" lang="zh-CN" altLang="en-US"/>
           </a:p>
@@ -3122,13 +3084,13 @@
   <p:clrMapOvr>
     <a:masterClrMapping/>
   </p:clrMapOvr>
-  <mc:AlternateContent xmlns:mc="http://schemas.openxmlformats.org/markup-compatibility/2006">
-    <mc:Choice xmlns:p14="http://schemas.microsoft.com/office/powerpoint/2010/main" Requires="p14">
+  <mc:AlternateContent xmlns:mc="http://schemas.openxmlformats.org/markup-compatibility/2006" xmlns:p14="http://schemas.microsoft.com/office/powerpoint/2010/main">
+    <mc:Choice Requires="p14">
       <p:transition spd="slow" p14:dur="1500" advTm="2000">
         <p:random/>
       </p:transition>
     </mc:Choice>
-    <mc:Fallback>
+    <mc:Fallback xmlns="">
       <p:transition spd="slow" advTm="2000">
         <p:random/>
       </p:transition>
@@ -3178,7 +3140,6 @@
               <a:rPr kumimoji="1" lang="zh-CN" altLang="en-US"/>
               <a:t>单击此处编辑母版标题样式</a:t>
             </a:r>
-            <a:endParaRPr kumimoji="1" lang="zh-CN" altLang="en-US"/>
           </a:p>
         </p:txBody>
       </p:sp>
@@ -3244,7 +3205,6 @@
               <a:rPr kumimoji="1" lang="zh-CN" altLang="en-US"/>
               <a:t>单击此处编辑母版文本样式</a:t>
             </a:r>
-            <a:endParaRPr kumimoji="1" lang="zh-CN" altLang="en-US"/>
           </a:p>
         </p:txBody>
       </p:sp>
@@ -3273,7 +3233,6 @@
               <a:rPr kumimoji="1" lang="zh-CN" altLang="en-US"/>
               <a:t>单击此处编辑母版文本样式</a:t>
             </a:r>
-            <a:endParaRPr kumimoji="1" lang="zh-CN" altLang="en-US"/>
           </a:p>
           <a:p>
             <a:pPr lvl="1"/>
@@ -3281,7 +3240,6 @@
               <a:rPr kumimoji="1" lang="zh-CN" altLang="en-US"/>
               <a:t>二级</a:t>
             </a:r>
-            <a:endParaRPr kumimoji="1" lang="zh-CN" altLang="en-US"/>
           </a:p>
           <a:p>
             <a:pPr lvl="2"/>
@@ -3289,7 +3247,6 @@
               <a:rPr kumimoji="1" lang="zh-CN" altLang="en-US"/>
               <a:t>三级</a:t>
             </a:r>
-            <a:endParaRPr kumimoji="1" lang="zh-CN" altLang="en-US"/>
           </a:p>
           <a:p>
             <a:pPr lvl="3"/>
@@ -3297,7 +3254,6 @@
               <a:rPr kumimoji="1" lang="zh-CN" altLang="en-US"/>
               <a:t>四级</a:t>
             </a:r>
-            <a:endParaRPr kumimoji="1" lang="zh-CN" altLang="en-US"/>
           </a:p>
           <a:p>
             <a:pPr lvl="4"/>
@@ -3305,7 +3261,6 @@
               <a:rPr kumimoji="1" lang="zh-CN" altLang="en-US"/>
               <a:t>五级</a:t>
             </a:r>
-            <a:endParaRPr kumimoji="1" lang="zh-CN" altLang="en-US"/>
           </a:p>
         </p:txBody>
       </p:sp>
@@ -3371,7 +3326,6 @@
               <a:rPr kumimoji="1" lang="zh-CN" altLang="en-US"/>
               <a:t>单击此处编辑母版文本样式</a:t>
             </a:r>
-            <a:endParaRPr kumimoji="1" lang="zh-CN" altLang="en-US"/>
           </a:p>
         </p:txBody>
       </p:sp>
@@ -3400,7 +3354,6 @@
               <a:rPr kumimoji="1" lang="zh-CN" altLang="en-US"/>
               <a:t>单击此处编辑母版文本样式</a:t>
             </a:r>
-            <a:endParaRPr kumimoji="1" lang="zh-CN" altLang="en-US"/>
           </a:p>
           <a:p>
             <a:pPr lvl="1"/>
@@ -3408,7 +3361,6 @@
               <a:rPr kumimoji="1" lang="zh-CN" altLang="en-US"/>
               <a:t>二级</a:t>
             </a:r>
-            <a:endParaRPr kumimoji="1" lang="zh-CN" altLang="en-US"/>
           </a:p>
           <a:p>
             <a:pPr lvl="2"/>
@@ -3416,7 +3368,6 @@
               <a:rPr kumimoji="1" lang="zh-CN" altLang="en-US"/>
               <a:t>三级</a:t>
             </a:r>
-            <a:endParaRPr kumimoji="1" lang="zh-CN" altLang="en-US"/>
           </a:p>
           <a:p>
             <a:pPr lvl="3"/>
@@ -3424,7 +3375,6 @@
               <a:rPr kumimoji="1" lang="zh-CN" altLang="en-US"/>
               <a:t>四级</a:t>
             </a:r>
-            <a:endParaRPr kumimoji="1" lang="zh-CN" altLang="en-US"/>
           </a:p>
           <a:p>
             <a:pPr lvl="4"/>
@@ -3432,7 +3382,6 @@
               <a:rPr kumimoji="1" lang="zh-CN" altLang="en-US"/>
               <a:t>五级</a:t>
             </a:r>
-            <a:endParaRPr kumimoji="1" lang="zh-CN" altLang="en-US"/>
           </a:p>
         </p:txBody>
       </p:sp>
@@ -3453,6 +3402,7 @@
           <a:p>
             <a:fld id="{F12C73A2-79A2-FF47-AE98-0E0281E6DC1A}" type="datetimeFigureOut">
               <a:rPr kumimoji="1" lang="zh-CN" altLang="en-US" smtClean="0"/>
+              <a:t>2024/3/4</a:t>
             </a:fld>
             <a:endParaRPr kumimoji="1" lang="zh-CN" altLang="en-US"/>
           </a:p>
@@ -3494,6 +3444,7 @@
           <a:p>
             <a:fld id="{20364DC8-64AD-F644-B4F9-F8048085E0CF}" type="slidenum">
               <a:rPr kumimoji="1" lang="zh-CN" altLang="en-US" smtClean="0"/>
+              <a:t>‹#›</a:t>
             </a:fld>
             <a:endParaRPr kumimoji="1" lang="zh-CN" altLang="en-US"/>
           </a:p>
@@ -3587,13 +3538,13 @@
   <p:clrMapOvr>
     <a:masterClrMapping/>
   </p:clrMapOvr>
-  <mc:AlternateContent xmlns:mc="http://schemas.openxmlformats.org/markup-compatibility/2006">
-    <mc:Choice xmlns:p14="http://schemas.microsoft.com/office/powerpoint/2010/main" Requires="p14">
+  <mc:AlternateContent xmlns:mc="http://schemas.openxmlformats.org/markup-compatibility/2006" xmlns:p14="http://schemas.microsoft.com/office/powerpoint/2010/main">
+    <mc:Choice Requires="p14">
       <p:transition spd="slow" p14:dur="1500" advTm="2000">
         <p:random/>
       </p:transition>
     </mc:Choice>
-    <mc:Fallback>
+    <mc:Fallback xmlns="">
       <p:transition spd="slow" advTm="2000">
         <p:random/>
       </p:transition>
@@ -3638,7 +3589,6 @@
               <a:rPr kumimoji="1" lang="zh-CN" altLang="en-US"/>
               <a:t>单击此处编辑母版标题样式</a:t>
             </a:r>
-            <a:endParaRPr kumimoji="1" lang="zh-CN" altLang="en-US"/>
           </a:p>
         </p:txBody>
       </p:sp>
@@ -3659,6 +3609,7 @@
           <a:p>
             <a:fld id="{F12C73A2-79A2-FF47-AE98-0E0281E6DC1A}" type="datetimeFigureOut">
               <a:rPr kumimoji="1" lang="zh-CN" altLang="en-US" smtClean="0"/>
+              <a:t>2024/3/4</a:t>
             </a:fld>
             <a:endParaRPr kumimoji="1" lang="zh-CN" altLang="en-US"/>
           </a:p>
@@ -3700,6 +3651,7 @@
           <a:p>
             <a:fld id="{20364DC8-64AD-F644-B4F9-F8048085E0CF}" type="slidenum">
               <a:rPr kumimoji="1" lang="zh-CN" altLang="en-US" smtClean="0"/>
+              <a:t>‹#›</a:t>
             </a:fld>
             <a:endParaRPr kumimoji="1" lang="zh-CN" altLang="en-US"/>
           </a:p>
@@ -3710,13 +3662,13 @@
   <p:clrMapOvr>
     <a:masterClrMapping/>
   </p:clrMapOvr>
-  <mc:AlternateContent xmlns:mc="http://schemas.openxmlformats.org/markup-compatibility/2006">
-    <mc:Choice xmlns:p14="http://schemas.microsoft.com/office/powerpoint/2010/main" Requires="p14">
+  <mc:AlternateContent xmlns:mc="http://schemas.openxmlformats.org/markup-compatibility/2006" xmlns:p14="http://schemas.microsoft.com/office/powerpoint/2010/main">
+    <mc:Choice Requires="p14">
       <p:transition spd="slow" p14:dur="1500" advTm="2000">
         <p:random/>
       </p:transition>
     </mc:Choice>
-    <mc:Fallback>
+    <mc:Fallback xmlns="">
       <p:transition spd="slow" advTm="2000">
         <p:random/>
       </p:transition>
@@ -3759,6 +3711,7 @@
           <a:p>
             <a:fld id="{F12C73A2-79A2-FF47-AE98-0E0281E6DC1A}" type="datetimeFigureOut">
               <a:rPr kumimoji="1" lang="zh-CN" altLang="en-US" smtClean="0"/>
+              <a:t>2024/3/4</a:t>
             </a:fld>
             <a:endParaRPr kumimoji="1" lang="zh-CN" altLang="en-US"/>
           </a:p>
@@ -3800,6 +3753,7 @@
           <a:p>
             <a:fld id="{20364DC8-64AD-F644-B4F9-F8048085E0CF}" type="slidenum">
               <a:rPr kumimoji="1" lang="zh-CN" altLang="en-US" smtClean="0"/>
+              <a:t>‹#›</a:t>
             </a:fld>
             <a:endParaRPr kumimoji="1" lang="zh-CN" altLang="en-US"/>
           </a:p>
@@ -3810,13 +3764,13 @@
   <p:clrMapOvr>
     <a:masterClrMapping/>
   </p:clrMapOvr>
-  <mc:AlternateContent xmlns:mc="http://schemas.openxmlformats.org/markup-compatibility/2006">
-    <mc:Choice xmlns:p14="http://schemas.microsoft.com/office/powerpoint/2010/main" Requires="p14">
+  <mc:AlternateContent xmlns:mc="http://schemas.openxmlformats.org/markup-compatibility/2006" xmlns:p14="http://schemas.microsoft.com/office/powerpoint/2010/main">
+    <mc:Choice Requires="p14">
       <p:transition spd="slow" p14:dur="1500" advTm="2000">
         <p:random/>
       </p:transition>
     </mc:Choice>
-    <mc:Fallback>
+    <mc:Fallback xmlns="">
       <p:transition spd="slow" advTm="2000">
         <p:random/>
       </p:transition>
@@ -3870,7 +3824,6 @@
               <a:rPr kumimoji="1" lang="zh-CN" altLang="en-US"/>
               <a:t>单击此处编辑母版标题样式</a:t>
             </a:r>
-            <a:endParaRPr kumimoji="1" lang="zh-CN" altLang="en-US"/>
           </a:p>
         </p:txBody>
       </p:sp>
@@ -3927,7 +3880,6 @@
               <a:rPr kumimoji="1" lang="zh-CN" altLang="en-US"/>
               <a:t>单击此处编辑母版文本样式</a:t>
             </a:r>
-            <a:endParaRPr kumimoji="1" lang="zh-CN" altLang="en-US"/>
           </a:p>
           <a:p>
             <a:pPr lvl="1"/>
@@ -3935,7 +3887,6 @@
               <a:rPr kumimoji="1" lang="zh-CN" altLang="en-US"/>
               <a:t>二级</a:t>
             </a:r>
-            <a:endParaRPr kumimoji="1" lang="zh-CN" altLang="en-US"/>
           </a:p>
           <a:p>
             <a:pPr lvl="2"/>
@@ -3943,7 +3894,6 @@
               <a:rPr kumimoji="1" lang="zh-CN" altLang="en-US"/>
               <a:t>三级</a:t>
             </a:r>
-            <a:endParaRPr kumimoji="1" lang="zh-CN" altLang="en-US"/>
           </a:p>
           <a:p>
             <a:pPr lvl="3"/>
@@ -3951,7 +3901,6 @@
               <a:rPr kumimoji="1" lang="zh-CN" altLang="en-US"/>
               <a:t>四级</a:t>
             </a:r>
-            <a:endParaRPr kumimoji="1" lang="zh-CN" altLang="en-US"/>
           </a:p>
           <a:p>
             <a:pPr lvl="4"/>
@@ -3959,7 +3908,6 @@
               <a:rPr kumimoji="1" lang="zh-CN" altLang="en-US"/>
               <a:t>五级</a:t>
             </a:r>
-            <a:endParaRPr kumimoji="1" lang="zh-CN" altLang="en-US"/>
           </a:p>
         </p:txBody>
       </p:sp>
@@ -4025,7 +3973,6 @@
               <a:rPr kumimoji="1" lang="zh-CN" altLang="en-US"/>
               <a:t>单击此处编辑母版文本样式</a:t>
             </a:r>
-            <a:endParaRPr kumimoji="1" lang="zh-CN" altLang="en-US"/>
           </a:p>
         </p:txBody>
       </p:sp>
@@ -4046,6 +3993,7 @@
           <a:p>
             <a:fld id="{F12C73A2-79A2-FF47-AE98-0E0281E6DC1A}" type="datetimeFigureOut">
               <a:rPr kumimoji="1" lang="zh-CN" altLang="en-US" smtClean="0"/>
+              <a:t>2024/3/4</a:t>
             </a:fld>
             <a:endParaRPr kumimoji="1" lang="zh-CN" altLang="en-US"/>
           </a:p>
@@ -4087,6 +4035,7 @@
           <a:p>
             <a:fld id="{20364DC8-64AD-F644-B4F9-F8048085E0CF}" type="slidenum">
               <a:rPr kumimoji="1" lang="zh-CN" altLang="en-US" smtClean="0"/>
+              <a:t>‹#›</a:t>
             </a:fld>
             <a:endParaRPr kumimoji="1" lang="zh-CN" altLang="en-US"/>
           </a:p>
@@ -4097,13 +4046,13 @@
   <p:clrMapOvr>
     <a:masterClrMapping/>
   </p:clrMapOvr>
-  <mc:AlternateContent xmlns:mc="http://schemas.openxmlformats.org/markup-compatibility/2006">
-    <mc:Choice xmlns:p14="http://schemas.microsoft.com/office/powerpoint/2010/main" Requires="p14">
+  <mc:AlternateContent xmlns:mc="http://schemas.openxmlformats.org/markup-compatibility/2006" xmlns:p14="http://schemas.microsoft.com/office/powerpoint/2010/main">
+    <mc:Choice Requires="p14">
       <p:transition spd="slow" p14:dur="1500" advTm="2000">
         <p:random/>
       </p:transition>
     </mc:Choice>
-    <mc:Fallback>
+    <mc:Fallback xmlns="">
       <p:transition spd="slow" advTm="2000">
         <p:random/>
       </p:transition>
@@ -4163,7 +4112,6 @@
               <a:rPr kumimoji="1" lang="zh-CN" altLang="en-US"/>
               <a:t>单击此处编辑母版标题样式</a:t>
             </a:r>
-            <a:endParaRPr kumimoji="1" lang="zh-CN" altLang="en-US"/>
           </a:p>
         </p:txBody>
       </p:sp>
@@ -4197,7 +4145,6 @@
               <a:rPr kumimoji="1" lang="zh-CN" altLang="en-US"/>
               <a:t>单击此处编辑母版文本样式</a:t>
             </a:r>
-            <a:endParaRPr kumimoji="1" lang="zh-CN" altLang="en-US"/>
           </a:p>
           <a:p>
             <a:pPr lvl="1"/>
@@ -4205,7 +4152,6 @@
               <a:rPr kumimoji="1" lang="zh-CN" altLang="en-US"/>
               <a:t>二级</a:t>
             </a:r>
-            <a:endParaRPr kumimoji="1" lang="zh-CN" altLang="en-US"/>
           </a:p>
           <a:p>
             <a:pPr lvl="2"/>
@@ -4213,7 +4159,6 @@
               <a:rPr kumimoji="1" lang="zh-CN" altLang="en-US"/>
               <a:t>三级</a:t>
             </a:r>
-            <a:endParaRPr kumimoji="1" lang="zh-CN" altLang="en-US"/>
           </a:p>
           <a:p>
             <a:pPr lvl="3"/>
@@ -4221,7 +4166,6 @@
               <a:rPr kumimoji="1" lang="zh-CN" altLang="en-US"/>
               <a:t>四级</a:t>
             </a:r>
-            <a:endParaRPr kumimoji="1" lang="zh-CN" altLang="en-US"/>
           </a:p>
           <a:p>
             <a:pPr lvl="4"/>
@@ -4229,7 +4173,6 @@
               <a:rPr kumimoji="1" lang="zh-CN" altLang="en-US"/>
               <a:t>五级</a:t>
             </a:r>
-            <a:endParaRPr kumimoji="1" lang="zh-CN" altLang="en-US"/>
           </a:p>
         </p:txBody>
       </p:sp>
@@ -4268,6 +4211,7 @@
           <a:p>
             <a:fld id="{F12C73A2-79A2-FF47-AE98-0E0281E6DC1A}" type="datetimeFigureOut">
               <a:rPr kumimoji="1" lang="zh-CN" altLang="en-US" smtClean="0"/>
+              <a:t>2024/3/4</a:t>
             </a:fld>
             <a:endParaRPr kumimoji="1" lang="zh-CN" altLang="en-US"/>
           </a:p>
@@ -4345,6 +4289,7 @@
           <a:p>
             <a:fld id="{20364DC8-64AD-F644-B4F9-F8048085E0CF}" type="slidenum">
               <a:rPr kumimoji="1" lang="zh-CN" altLang="en-US" smtClean="0"/>
+              <a:t>‹#›</a:t>
             </a:fld>
             <a:endParaRPr kumimoji="1" lang="zh-CN" altLang="en-US"/>
           </a:p>
@@ -4373,13 +4318,13 @@
     <p:sldLayoutId id="2147483665" r:id="rId17"/>
     <p:sldLayoutId id="2147483666" r:id="rId18"/>
   </p:sldLayoutIdLst>
-  <mc:AlternateContent xmlns:mc="http://schemas.openxmlformats.org/markup-compatibility/2006">
-    <mc:Choice xmlns:p14="http://schemas.microsoft.com/office/powerpoint/2010/main" Requires="p14">
+  <mc:AlternateContent xmlns:mc="http://schemas.openxmlformats.org/markup-compatibility/2006" xmlns:p14="http://schemas.microsoft.com/office/powerpoint/2010/main">
+    <mc:Choice Requires="p14">
       <p:transition spd="slow" p14:dur="1500" advTm="2000">
         <p:random/>
       </p:transition>
     </mc:Choice>
-    <mc:Fallback>
+    <mc:Fallback xmlns="">
       <p:transition spd="slow" advTm="2000">
         <p:random/>
       </p:transition>
@@ -4977,7 +4922,7 @@
           <p:nvPr/>
         </p:nvPicPr>
         <p:blipFill>
-          <a:blip r:embed="rId1"/>
+          <a:blip r:embed="rId4"/>
           <a:srcRect/>
           <a:stretch>
             <a:fillRect/>
@@ -5244,7 +5189,7 @@
               <a:t>    </a:t>
             </a:r>
             <a:r>
-              <a:rPr kumimoji="1" lang="zh-CN" altLang="en-US" sz="1865" dirty="0">
+              <a:rPr kumimoji="1" lang="zh-CN" altLang="en-US" sz="1865">
                 <a:solidFill>
                   <a:schemeClr val="bg1">
                     <a:lumMod val="50000"/>
@@ -5253,67 +5198,7 @@
                 <a:cs typeface="+mn-ea"/>
                 <a:sym typeface="+mn-lt"/>
               </a:rPr>
-              <a:t>成员：游洋</a:t>
-            </a:r>
-            <a:r>
-              <a:rPr kumimoji="1" lang="en-US" altLang="zh-CN" sz="1865" dirty="0">
-                <a:solidFill>
-                  <a:schemeClr val="bg1">
-                    <a:lumMod val="50000"/>
-                  </a:schemeClr>
-                </a:solidFill>
-                <a:cs typeface="+mn-ea"/>
-                <a:sym typeface="+mn-lt"/>
-              </a:rPr>
-              <a:t> </a:t>
-            </a:r>
-            <a:r>
-              <a:rPr kumimoji="1" lang="zh-CN" altLang="en-US" sz="1865" dirty="0">
-                <a:solidFill>
-                  <a:schemeClr val="bg1">
-                    <a:lumMod val="50000"/>
-                  </a:schemeClr>
-                </a:solidFill>
-                <a:cs typeface="+mn-ea"/>
-                <a:sym typeface="+mn-lt"/>
-              </a:rPr>
-              <a:t>呙自桥</a:t>
-            </a:r>
-            <a:r>
-              <a:rPr kumimoji="1" lang="en-US" altLang="zh-CN" sz="1865" dirty="0">
-                <a:solidFill>
-                  <a:schemeClr val="bg1">
-                    <a:lumMod val="50000"/>
-                  </a:schemeClr>
-                </a:solidFill>
-                <a:cs typeface="+mn-ea"/>
-                <a:sym typeface="+mn-lt"/>
-              </a:rPr>
-              <a:t> </a:t>
-            </a:r>
-            <a:r>
-              <a:rPr kumimoji="1" lang="zh-CN" altLang="en-US" sz="1865" dirty="0">
-                <a:solidFill>
-                  <a:schemeClr val="bg1">
-                    <a:lumMod val="50000"/>
-                  </a:schemeClr>
-                </a:solidFill>
-                <a:cs typeface="+mn-ea"/>
-                <a:sym typeface="+mn-lt"/>
-              </a:rPr>
-              <a:t>成俊</a:t>
-            </a:r>
-            <a:r>
-              <a:rPr kumimoji="1" lang="zh-CN" altLang="en-US" sz="1865" dirty="0">
-                <a:solidFill>
-                  <a:schemeClr val="bg1">
-                    <a:lumMod val="50000"/>
-                  </a:schemeClr>
-                </a:solidFill>
-                <a:cs typeface="+mn-ea"/>
-                <a:sym typeface="+mn-lt"/>
-              </a:rPr>
-              <a:t>宏</a:t>
+              <a:t>成员：</a:t>
             </a:r>
             <a:endParaRPr kumimoji="1" lang="zh-CN" altLang="en-US" sz="1865" dirty="0">
               <a:solidFill>
@@ -5443,7 +5328,7 @@
           </p:cNvSpPr>
           <p:nvPr>
             <p:custDataLst>
-              <p:tags r:id="rId2"/>
+              <p:tags r:id="rId1"/>
             </p:custDataLst>
           </p:nvPr>
         </p:nvSpPr>
@@ -5663,21 +5548,6 @@
               </a:rPr>
               <a:t>2023</a:t>
             </a:r>
-            <a:endParaRPr kumimoji="0" lang="en-US" altLang="zh-CN" sz="11600" i="0" u="none" strike="noStrike" cap="none" normalizeH="0" baseline="0" dirty="0">
-              <a:ln>
-                <a:noFill/>
-              </a:ln>
-              <a:solidFill>
-                <a:schemeClr val="bg1">
-                  <a:lumMod val="50000"/>
-                </a:schemeClr>
-              </a:solidFill>
-              <a:effectLst/>
-              <a:latin typeface="+mn-lt"/>
-              <a:ea typeface="+mn-ea"/>
-              <a:cs typeface="+mn-ea"/>
-              <a:sym typeface="+mn-lt"/>
-            </a:endParaRPr>
           </a:p>
         </p:txBody>
       </p:sp>
@@ -5689,7 +5559,7 @@
           </p:cNvSpPr>
           <p:nvPr>
             <p:custDataLst>
-              <p:tags r:id="rId3"/>
+              <p:tags r:id="rId2"/>
             </p:custDataLst>
           </p:nvPr>
         </p:nvSpPr>
@@ -5945,21 +5815,6 @@
               </a:rPr>
               <a:t>课程设计</a:t>
             </a:r>
-            <a:endParaRPr kumimoji="0" lang="zh-CN" altLang="en-US" sz="3400" i="0" u="none" strike="noStrike" cap="none" normalizeH="0" baseline="0" dirty="0">
-              <a:ln>
-                <a:noFill/>
-              </a:ln>
-              <a:solidFill>
-                <a:schemeClr val="bg1">
-                  <a:lumMod val="50000"/>
-                </a:schemeClr>
-              </a:solidFill>
-              <a:effectLst/>
-              <a:latin typeface="+mn-lt"/>
-              <a:ea typeface="+mn-ea"/>
-              <a:cs typeface="+mn-ea"/>
-              <a:sym typeface="+mn-lt"/>
-            </a:endParaRPr>
           </a:p>
         </p:txBody>
       </p:sp>
@@ -6009,15 +5864,6 @@
               </a:rPr>
               <a:t>多功能应用平台</a:t>
             </a:r>
-            <a:endParaRPr kumimoji="1" lang="zh-CN" altLang="en-US" sz="2400" b="1" dirty="0">
-              <a:solidFill>
-                <a:schemeClr val="bg1">
-                  <a:lumMod val="50000"/>
-                </a:schemeClr>
-              </a:solidFill>
-              <a:cs typeface="+mn-ea"/>
-              <a:sym typeface="+mn-lt"/>
-            </a:endParaRPr>
           </a:p>
         </p:txBody>
       </p:sp>
@@ -6026,20 +5872,20 @@
   <p:clrMapOvr>
     <a:masterClrMapping/>
   </p:clrMapOvr>
-  <mc:AlternateContent xmlns:mc="http://schemas.openxmlformats.org/markup-compatibility/2006">
-    <mc:Choice xmlns:p14="http://schemas.microsoft.com/office/powerpoint/2010/main" Requires="p14">
+  <mc:AlternateContent xmlns:mc="http://schemas.openxmlformats.org/markup-compatibility/2006" xmlns:p14="http://schemas.microsoft.com/office/powerpoint/2010/main">
+    <mc:Choice Requires="p14">
       <p:transition spd="slow" p14:dur="1500">
         <p:random/>
       </p:transition>
     </mc:Choice>
-    <mc:Fallback>
+    <mc:Fallback xmlns="">
       <p:transition spd="slow">
         <p:random/>
       </p:transition>
     </mc:Fallback>
   </mc:AlternateContent>
-  <mc:AlternateContent xmlns:mc="http://schemas.openxmlformats.org/markup-compatibility/2006">
-    <mc:Choice xmlns:p14="http://schemas.microsoft.com/office/powerpoint/2010/main" Requires="p14">
+  <mc:AlternateContent xmlns:mc="http://schemas.openxmlformats.org/markup-compatibility/2006" xmlns:p14="http://schemas.microsoft.com/office/powerpoint/2010/main">
+    <mc:Choice Requires="p14">
       <p:timing>
         <p:tnLst>
           <p:par>
@@ -6944,7 +6790,7 @@
         </p:bldLst>
       </p:timing>
     </mc:Choice>
-    <mc:Fallback>
+    <mc:Fallback xmlns="">
       <p:timing>
         <p:tnLst>
           <p:par>
@@ -8109,15 +7955,6 @@
               </a:rPr>
               <a:t>目录</a:t>
             </a:r>
-            <a:endParaRPr kumimoji="1" lang="zh-CN" altLang="en-US" sz="3600" b="1" dirty="0">
-              <a:solidFill>
-                <a:schemeClr val="bg1">
-                  <a:lumMod val="50000"/>
-                </a:schemeClr>
-              </a:solidFill>
-              <a:cs typeface="+mn-ea"/>
-              <a:sym typeface="+mn-lt"/>
-            </a:endParaRPr>
           </a:p>
         </p:txBody>
       </p:sp>
@@ -8270,15 +8107,6 @@
               </a:rPr>
               <a:t>通讯录</a:t>
             </a:r>
-            <a:endParaRPr lang="zh-CN" altLang="en-US" sz="2400" dirty="0">
-              <a:solidFill>
-                <a:schemeClr val="bg1">
-                  <a:lumMod val="50000"/>
-                </a:schemeClr>
-              </a:solidFill>
-              <a:cs typeface="+mn-ea"/>
-              <a:sym typeface="+mn-lt"/>
-            </a:endParaRPr>
           </a:p>
           <a:p>
             <a:endParaRPr lang="zh-CN" altLang="en-US" sz="1200" dirty="0">
@@ -8544,13 +8372,13 @@
   <p:clrMapOvr>
     <a:masterClrMapping/>
   </p:clrMapOvr>
-  <mc:AlternateContent xmlns:mc="http://schemas.openxmlformats.org/markup-compatibility/2006">
-    <mc:Choice xmlns:p14="http://schemas.microsoft.com/office/powerpoint/2010/main" Requires="p14">
+  <mc:AlternateContent xmlns:mc="http://schemas.openxmlformats.org/markup-compatibility/2006" xmlns:p14="http://schemas.microsoft.com/office/powerpoint/2010/main">
+    <mc:Choice Requires="p14">
       <p:transition spd="slow" p14:dur="1500">
         <p:random/>
       </p:transition>
     </mc:Choice>
-    <mc:Fallback>
+    <mc:Fallback xmlns="">
       <p:transition spd="slow">
         <p:random/>
       </p:transition>
@@ -9102,17 +8930,6 @@
               </a:rPr>
               <a:t>迷宫</a:t>
             </a:r>
-            <a:endParaRPr kumimoji="1" lang="zh-CN" altLang="en-US" sz="6000" b="1" dirty="0">
-              <a:solidFill>
-                <a:schemeClr val="bg1">
-                  <a:lumMod val="50000"/>
-                </a:schemeClr>
-              </a:solidFill>
-              <a:latin typeface="+mn-lt"/>
-              <a:ea typeface="+mn-ea"/>
-              <a:cs typeface="+mn-ea"/>
-              <a:sym typeface="+mn-lt"/>
-            </a:endParaRPr>
           </a:p>
           <a:p>
             <a:pPr eaLnBrk="1" hangingPunct="1">
@@ -9438,13 +9255,13 @@
   <p:clrMapOvr>
     <a:masterClrMapping/>
   </p:clrMapOvr>
-  <mc:AlternateContent xmlns:mc="http://schemas.openxmlformats.org/markup-compatibility/2006">
-    <mc:Choice xmlns:p14="http://schemas.microsoft.com/office/powerpoint/2010/main" Requires="p14">
+  <mc:AlternateContent xmlns:mc="http://schemas.openxmlformats.org/markup-compatibility/2006" xmlns:p14="http://schemas.microsoft.com/office/powerpoint/2010/main">
+    <mc:Choice Requires="p14">
       <p:transition spd="slow" p14:dur="1500">
         <p:random/>
       </p:transition>
     </mc:Choice>
-    <mc:Fallback>
+    <mc:Fallback xmlns="">
       <p:transition spd="slow">
         <p:random/>
       </p:transition>
@@ -10086,17 +9903,6 @@
               </a:rPr>
               <a:t>扫雷</a:t>
             </a:r>
-            <a:endParaRPr kumimoji="1" lang="zh-CN" altLang="en-US" sz="6000" b="1" dirty="0">
-              <a:solidFill>
-                <a:schemeClr val="bg1">
-                  <a:lumMod val="50000"/>
-                </a:schemeClr>
-              </a:solidFill>
-              <a:latin typeface="+mn-lt"/>
-              <a:ea typeface="+mn-ea"/>
-              <a:cs typeface="+mn-ea"/>
-              <a:sym typeface="+mn-lt"/>
-            </a:endParaRPr>
           </a:p>
           <a:p>
             <a:pPr eaLnBrk="1" hangingPunct="1">
@@ -10293,15 +10099,6 @@
               </a:rPr>
               <a:t>4.    DFS</a:t>
             </a:r>
-            <a:endParaRPr kumimoji="1" lang="en-US" altLang="zh-CN" sz="2800" b="1" dirty="0">
-              <a:solidFill>
-                <a:schemeClr val="bg1">
-                  <a:lumMod val="50000"/>
-                </a:schemeClr>
-              </a:solidFill>
-              <a:cs typeface="+mn-ea"/>
-              <a:sym typeface="+mn-lt"/>
-            </a:endParaRPr>
           </a:p>
           <a:p>
             <a:pPr>
@@ -10434,13 +10231,13 @@
   <p:clrMapOvr>
     <a:masterClrMapping/>
   </p:clrMapOvr>
-  <mc:AlternateContent xmlns:mc="http://schemas.openxmlformats.org/markup-compatibility/2006">
-    <mc:Choice xmlns:p14="http://schemas.microsoft.com/office/powerpoint/2010/main" Requires="p14">
+  <mc:AlternateContent xmlns:mc="http://schemas.openxmlformats.org/markup-compatibility/2006" xmlns:p14="http://schemas.microsoft.com/office/powerpoint/2010/main">
+    <mc:Choice Requires="p14">
       <p:transition spd="slow" p14:dur="1500">
         <p:random/>
       </p:transition>
     </mc:Choice>
-    <mc:Fallback>
+    <mc:Fallback xmlns="">
       <p:transition spd="slow">
         <p:random/>
       </p:transition>
@@ -11082,17 +10879,6 @@
               </a:rPr>
               <a:t>通讯录</a:t>
             </a:r>
-            <a:endParaRPr kumimoji="1" lang="zh-CN" altLang="en-US" sz="6000" b="1" dirty="0">
-              <a:solidFill>
-                <a:schemeClr val="bg1">
-                  <a:lumMod val="50000"/>
-                </a:schemeClr>
-              </a:solidFill>
-              <a:latin typeface="+mn-lt"/>
-              <a:ea typeface="+mn-ea"/>
-              <a:cs typeface="+mn-ea"/>
-              <a:sym typeface="+mn-lt"/>
-            </a:endParaRPr>
           </a:p>
           <a:p>
             <a:pPr eaLnBrk="1" hangingPunct="1">
@@ -11339,29 +11125,8 @@
                 <a:cs typeface="+mn-ea"/>
                 <a:sym typeface="+mn-lt"/>
               </a:rPr>
-              <a:t>排序与</a:t>
-            </a:r>
-            <a:r>
-              <a:rPr kumimoji="1" lang="zh-CN" altLang="en-US" sz="2800" b="1" dirty="0">
-                <a:solidFill>
-                  <a:schemeClr val="bg1">
-                    <a:lumMod val="50000"/>
-                  </a:schemeClr>
-                </a:solidFill>
-                <a:cs typeface="+mn-ea"/>
-                <a:sym typeface="+mn-lt"/>
-              </a:rPr>
-              <a:t>优化</a:t>
-            </a:r>
-            <a:endParaRPr kumimoji="1" lang="zh-CN" altLang="en-US" sz="2800" b="1" dirty="0">
-              <a:solidFill>
-                <a:schemeClr val="bg1">
-                  <a:lumMod val="50000"/>
-                </a:schemeClr>
-              </a:solidFill>
-              <a:cs typeface="+mn-ea"/>
-              <a:sym typeface="+mn-lt"/>
-            </a:endParaRPr>
+              <a:t>排序与优化</a:t>
+            </a:r>
           </a:p>
         </p:txBody>
       </p:sp>
@@ -11478,13 +11243,13 @@
   <p:clrMapOvr>
     <a:masterClrMapping/>
   </p:clrMapOvr>
-  <mc:AlternateContent xmlns:mc="http://schemas.openxmlformats.org/markup-compatibility/2006">
-    <mc:Choice xmlns:p14="http://schemas.microsoft.com/office/powerpoint/2010/main" Requires="p14">
+  <mc:AlternateContent xmlns:mc="http://schemas.openxmlformats.org/markup-compatibility/2006" xmlns:p14="http://schemas.microsoft.com/office/powerpoint/2010/main">
+    <mc:Choice Requires="p14">
       <p:transition spd="slow" p14:dur="1500">
         <p:random/>
       </p:transition>
     </mc:Choice>
-    <mc:Fallback>
+    <mc:Fallback xmlns="">
       <p:transition spd="slow">
         <p:random/>
       </p:transition>
@@ -12342,15 +12107,6 @@
               </a:rPr>
               <a:t>感谢聆听 请多指点</a:t>
             </a:r>
-            <a:endParaRPr lang="zh-CN" altLang="en-US" sz="4400" b="1" dirty="0">
-              <a:solidFill>
-                <a:schemeClr val="bg1">
-                  <a:lumMod val="50000"/>
-                </a:schemeClr>
-              </a:solidFill>
-              <a:cs typeface="+mn-ea"/>
-              <a:sym typeface="+mn-lt"/>
-            </a:endParaRPr>
           </a:p>
         </p:txBody>
       </p:sp>
@@ -12359,13 +12115,13 @@
   <p:clrMapOvr>
     <a:masterClrMapping/>
   </p:clrMapOvr>
-  <mc:AlternateContent xmlns:mc="http://schemas.openxmlformats.org/markup-compatibility/2006">
-    <mc:Choice xmlns:p14="http://schemas.microsoft.com/office/powerpoint/2010/main" Requires="p14">
+  <mc:AlternateContent xmlns:mc="http://schemas.openxmlformats.org/markup-compatibility/2006" xmlns:p14="http://schemas.microsoft.com/office/powerpoint/2010/main">
+    <mc:Choice Requires="p14">
       <p:transition spd="slow" p14:dur="1500">
         <p:random/>
       </p:transition>
     </mc:Choice>
-    <mc:Fallback>
+    <mc:Fallback xmlns="">
       <p:transition spd="slow">
         <p:random/>
       </p:transition>
@@ -13100,21 +12856,21 @@
 </file>
 
 <file path=ppt/tags/tag1.xml><?xml version="1.0" encoding="utf-8"?>
-<p:tagLst xmlns:p="http://schemas.openxmlformats.org/presentationml/2006/main">
-  <p:tag name="PA" val="v3.0.1"/>
+<p:tagLst xmlns:a="http://schemas.openxmlformats.org/drawingml/2006/main" xmlns:r="http://schemas.openxmlformats.org/officeDocument/2006/relationships" xmlns:p="http://schemas.openxmlformats.org/presentationml/2006/main">
+  <p:tag name="KSO_WPP_MARK_KEY" val="b2fee2c7-52f0-452a-9853-abd9b0c92d94"/>
+  <p:tag name="COMMONDATA" val="eyJoZGlkIjoiMWM4MmVkOTA1MjFjYzMwZWNmZGFhODliZDBjZWU4YWMifQ=="/>
 </p:tagLst>
 </file>
 
 <file path=ppt/tags/tag2.xml><?xml version="1.0" encoding="utf-8"?>
-<p:tagLst xmlns:p="http://schemas.openxmlformats.org/presentationml/2006/main">
+<p:tagLst xmlns:a="http://schemas.openxmlformats.org/drawingml/2006/main" xmlns:r="http://schemas.openxmlformats.org/officeDocument/2006/relationships" xmlns:p="http://schemas.openxmlformats.org/presentationml/2006/main">
   <p:tag name="PA" val="v3.0.1"/>
 </p:tagLst>
 </file>
 
 <file path=ppt/tags/tag3.xml><?xml version="1.0" encoding="utf-8"?>
-<p:tagLst xmlns:p="http://schemas.openxmlformats.org/presentationml/2006/main">
-  <p:tag name="KSO_WPP_MARK_KEY" val="b2fee2c7-52f0-452a-9853-abd9b0c92d94"/>
-  <p:tag name="COMMONDATA" val="eyJoZGlkIjoiMWM4MmVkOTA1MjFjYzMwZWNmZGFhODliZDBjZWU4YWMifQ=="/>
+<p:tagLst xmlns:a="http://schemas.openxmlformats.org/drawingml/2006/main" xmlns:r="http://schemas.openxmlformats.org/officeDocument/2006/relationships" xmlns:p="http://schemas.openxmlformats.org/presentationml/2006/main">
+  <p:tag name="PA" val="v3.0.1"/>
 </p:tagLst>
 </file>
 
@@ -13309,6 +13065,8 @@
       </a:bgFillStyleLst>
     </a:fmtScheme>
   </a:themeElements>
+  <a:objectDefaults/>
+  <a:extraClrSchemeLst/>
   <a:extLst>
     <a:ext uri="{05A4C25C-085E-4340-85A3-A5531E510DB2}">
       <thm15:themeFamily xmlns:thm15="http://schemas.microsoft.com/office/thememl/2012/main" name="Office Theme" id="{62F939B6-93AF-4DB8-9C6B-D6C7DFDC589F}" vid="{4A3C46E8-61CC-4603-A589-7422A47A8E4A}"/>
@@ -13597,6 +13355,8 @@
       </a:bgFillStyleLst>
     </a:fmtScheme>
   </a:themeElements>
+  <a:objectDefaults/>
+  <a:extraClrSchemeLst/>
   <a:extLst>
     <a:ext uri="{05A4C25C-085E-4340-85A3-A5531E510DB2}">
       <thm15:themeFamily xmlns:thm15="http://schemas.microsoft.com/office/thememl/2012/main" name="Office Theme" id="{62F939B6-93AF-4DB8-9C6B-D6C7DFDC589F}" vid="{4A3C46E8-61CC-4603-A589-7422A47A8E4A}"/>
@@ -13856,6 +13616,8 @@
       </a:bgFillStyleLst>
     </a:fmtScheme>
   </a:themeElements>
+  <a:objectDefaults/>
+  <a:extraClrSchemeLst/>
   <a:extLst>
     <a:ext uri="{05A4C25C-085E-4340-85A3-A5531E510DB2}">
       <thm15:themeFamily xmlns:thm15="http://schemas.microsoft.com/office/thememl/2012/main" name="Office Theme" id="{62F939B6-93AF-4DB8-9C6B-D6C7DFDC589F}" vid="{4A3C46E8-61CC-4603-A589-7422A47A8E4A}"/>

</xml_diff>